<commit_message>
edited ppt and readme files
</commit_message>
<xml_diff>
--- a/Presentations/CS410_FA2019_Presentation.pptx
+++ b/Presentations/CS410_FA2019_Presentation.pptx
@@ -18,6 +18,7 @@
     <p:sldId id="262" r:id="rId12"/>
     <p:sldId id="263" r:id="rId13"/>
     <p:sldId id="264" r:id="rId14"/>
+    <p:sldId id="273" r:id="rId15"/>
   </p:sldIdLst>
   <p:sldSz cx="12192000" cy="6858000"/>
   <p:notesSz cx="6858000" cy="9144000"/>
@@ -122,6 +123,212 @@
     </p:ext>
   </p:extLst>
 </p:presentation>
+</file>
+
+<file path=ppt/changesInfos/changesInfo1.xml><?xml version="1.0" encoding="utf-8"?>
+<pc:chgInfo xmlns:a="http://schemas.openxmlformats.org/drawingml/2006/main" xmlns:r="http://schemas.openxmlformats.org/officeDocument/2006/relationships" xmlns:ac="http://schemas.microsoft.com/office/drawing/2013/main/command" xmlns:pc="http://schemas.microsoft.com/office/powerpoint/2013/main/command">
+  <pc:docChgLst>
+    <pc:chgData name="Ron Swan" userId="44076a656deff5ba" providerId="LiveId" clId="{E503124C-2FAD-48FA-9C9B-BA6EF3D81ECE}"/>
+    <pc:docChg chg="custSel addSld modSld">
+      <pc:chgData name="Ron Swan" userId="44076a656deff5ba" providerId="LiveId" clId="{E503124C-2FAD-48FA-9C9B-BA6EF3D81ECE}" dt="2019-12-10T21:54:23.429" v="137" actId="20577"/>
+      <pc:docMkLst>
+        <pc:docMk/>
+      </pc:docMkLst>
+      <pc:sldChg chg="delSp modSp">
+        <pc:chgData name="Ron Swan" userId="44076a656deff5ba" providerId="LiveId" clId="{E503124C-2FAD-48FA-9C9B-BA6EF3D81ECE}" dt="2019-12-10T21:54:23.429" v="137" actId="20577"/>
+        <pc:sldMkLst>
+          <pc:docMk/>
+          <pc:sldMk cId="3684573453" sldId="257"/>
+        </pc:sldMkLst>
+        <pc:spChg chg="del mod">
+          <ac:chgData name="Ron Swan" userId="44076a656deff5ba" providerId="LiveId" clId="{E503124C-2FAD-48FA-9C9B-BA6EF3D81ECE}" dt="2019-12-10T21:53:26.179" v="104"/>
+          <ac:spMkLst>
+            <pc:docMk/>
+            <pc:sldMk cId="3684573453" sldId="257"/>
+            <ac:spMk id="6" creationId="{F4261642-FD63-420A-A617-487F754A6C94}"/>
+          </ac:spMkLst>
+        </pc:spChg>
+        <pc:spChg chg="mod">
+          <ac:chgData name="Ron Swan" userId="44076a656deff5ba" providerId="LiveId" clId="{E503124C-2FAD-48FA-9C9B-BA6EF3D81ECE}" dt="2019-12-10T21:53:46.294" v="114" actId="1076"/>
+          <ac:spMkLst>
+            <pc:docMk/>
+            <pc:sldMk cId="3684573453" sldId="257"/>
+            <ac:spMk id="8" creationId="{B5115544-5A90-4AF2-AEF2-F79A4E1037E6}"/>
+          </ac:spMkLst>
+        </pc:spChg>
+        <pc:spChg chg="mod">
+          <ac:chgData name="Ron Swan" userId="44076a656deff5ba" providerId="LiveId" clId="{E503124C-2FAD-48FA-9C9B-BA6EF3D81ECE}" dt="2019-12-10T21:54:23.429" v="137" actId="20577"/>
+          <ac:spMkLst>
+            <pc:docMk/>
+            <pc:sldMk cId="3684573453" sldId="257"/>
+            <ac:spMk id="9" creationId="{6D8C24F3-A58E-4CAC-B472-6E774C9CEF74}"/>
+          </ac:spMkLst>
+        </pc:spChg>
+        <pc:spChg chg="mod">
+          <ac:chgData name="Ron Swan" userId="44076a656deff5ba" providerId="LiveId" clId="{E503124C-2FAD-48FA-9C9B-BA6EF3D81ECE}" dt="2019-12-10T21:53:53.359" v="116" actId="1076"/>
+          <ac:spMkLst>
+            <pc:docMk/>
+            <pc:sldMk cId="3684573453" sldId="257"/>
+            <ac:spMk id="10" creationId="{B3AB559E-E40F-431A-ADF0-ED64132AF064}"/>
+          </ac:spMkLst>
+        </pc:spChg>
+      </pc:sldChg>
+      <pc:sldChg chg="addSp delSp modSp">
+        <pc:chgData name="Ron Swan" userId="44076a656deff5ba" providerId="LiveId" clId="{E503124C-2FAD-48FA-9C9B-BA6EF3D81ECE}" dt="2019-12-10T14:54:45.809" v="80"/>
+        <pc:sldMkLst>
+          <pc:docMk/>
+          <pc:sldMk cId="1388610654" sldId="258"/>
+        </pc:sldMkLst>
+        <pc:spChg chg="del mod">
+          <ac:chgData name="Ron Swan" userId="44076a656deff5ba" providerId="LiveId" clId="{E503124C-2FAD-48FA-9C9B-BA6EF3D81ECE}" dt="2019-12-10T14:54:45.809" v="80"/>
+          <ac:spMkLst>
+            <pc:docMk/>
+            <pc:sldMk cId="1388610654" sldId="258"/>
+            <ac:spMk id="3" creationId="{7E80B9DE-1FB2-4035-BA0B-C863A9A85F68}"/>
+          </ac:spMkLst>
+        </pc:spChg>
+        <pc:spChg chg="add mod">
+          <ac:chgData name="Ron Swan" userId="44076a656deff5ba" providerId="LiveId" clId="{E503124C-2FAD-48FA-9C9B-BA6EF3D81ECE}" dt="2019-12-10T14:54:45.809" v="80"/>
+          <ac:spMkLst>
+            <pc:docMk/>
+            <pc:sldMk cId="1388610654" sldId="258"/>
+            <ac:spMk id="4" creationId="{DF60E5D6-5969-4DDD-AE3B-5FB5C4B85C79}"/>
+          </ac:spMkLst>
+        </pc:spChg>
+      </pc:sldChg>
+      <pc:sldChg chg="addSp delSp modSp">
+        <pc:chgData name="Ron Swan" userId="44076a656deff5ba" providerId="LiveId" clId="{E503124C-2FAD-48FA-9C9B-BA6EF3D81ECE}" dt="2019-12-10T14:56:37.242" v="82"/>
+        <pc:sldMkLst>
+          <pc:docMk/>
+          <pc:sldMk cId="2865608864" sldId="261"/>
+        </pc:sldMkLst>
+        <pc:spChg chg="del mod">
+          <ac:chgData name="Ron Swan" userId="44076a656deff5ba" providerId="LiveId" clId="{E503124C-2FAD-48FA-9C9B-BA6EF3D81ECE}" dt="2019-12-10T14:56:37.242" v="82"/>
+          <ac:spMkLst>
+            <pc:docMk/>
+            <pc:sldMk cId="2865608864" sldId="261"/>
+            <ac:spMk id="3" creationId="{00A152CD-4285-4E88-BC88-159170865296}"/>
+          </ac:spMkLst>
+        </pc:spChg>
+        <pc:spChg chg="add mod">
+          <ac:chgData name="Ron Swan" userId="44076a656deff5ba" providerId="LiveId" clId="{E503124C-2FAD-48FA-9C9B-BA6EF3D81ECE}" dt="2019-12-10T14:56:37.242" v="82"/>
+          <ac:spMkLst>
+            <pc:docMk/>
+            <pc:sldMk cId="2865608864" sldId="261"/>
+            <ac:spMk id="4" creationId="{79BAA0D9-60A3-4B85-A709-DE00705903DC}"/>
+          </ac:spMkLst>
+        </pc:spChg>
+      </pc:sldChg>
+      <pc:sldChg chg="addSp delSp modSp">
+        <pc:chgData name="Ron Swan" userId="44076a656deff5ba" providerId="LiveId" clId="{E503124C-2FAD-48FA-9C9B-BA6EF3D81ECE}" dt="2019-12-10T14:56:48.007" v="84"/>
+        <pc:sldMkLst>
+          <pc:docMk/>
+          <pc:sldMk cId="2271376009" sldId="262"/>
+        </pc:sldMkLst>
+        <pc:spChg chg="del mod">
+          <ac:chgData name="Ron Swan" userId="44076a656deff5ba" providerId="LiveId" clId="{E503124C-2FAD-48FA-9C9B-BA6EF3D81ECE}" dt="2019-12-10T14:56:48.007" v="84"/>
+          <ac:spMkLst>
+            <pc:docMk/>
+            <pc:sldMk cId="2271376009" sldId="262"/>
+            <ac:spMk id="3" creationId="{6D5C250A-3D20-413E-8CE2-56CE0A7E94CE}"/>
+          </ac:spMkLst>
+        </pc:spChg>
+        <pc:spChg chg="add mod">
+          <ac:chgData name="Ron Swan" userId="44076a656deff5ba" providerId="LiveId" clId="{E503124C-2FAD-48FA-9C9B-BA6EF3D81ECE}" dt="2019-12-10T14:56:48.007" v="84"/>
+          <ac:spMkLst>
+            <pc:docMk/>
+            <pc:sldMk cId="2271376009" sldId="262"/>
+            <ac:spMk id="4" creationId="{4EDBB4BE-B5B7-423A-9971-9C344B132E53}"/>
+          </ac:spMkLst>
+        </pc:spChg>
+      </pc:sldChg>
+      <pc:sldChg chg="addSp delSp modSp">
+        <pc:chgData name="Ron Swan" userId="44076a656deff5ba" providerId="LiveId" clId="{E503124C-2FAD-48FA-9C9B-BA6EF3D81ECE}" dt="2019-12-10T14:57:07.368" v="86"/>
+        <pc:sldMkLst>
+          <pc:docMk/>
+          <pc:sldMk cId="3711652313" sldId="263"/>
+        </pc:sldMkLst>
+        <pc:spChg chg="del mod">
+          <ac:chgData name="Ron Swan" userId="44076a656deff5ba" providerId="LiveId" clId="{E503124C-2FAD-48FA-9C9B-BA6EF3D81ECE}" dt="2019-12-10T14:57:07.368" v="86"/>
+          <ac:spMkLst>
+            <pc:docMk/>
+            <pc:sldMk cId="3711652313" sldId="263"/>
+            <ac:spMk id="3" creationId="{605C0AD3-776C-4CA9-945C-9824E1F881A8}"/>
+          </ac:spMkLst>
+        </pc:spChg>
+        <pc:spChg chg="add mod">
+          <ac:chgData name="Ron Swan" userId="44076a656deff5ba" providerId="LiveId" clId="{E503124C-2FAD-48FA-9C9B-BA6EF3D81ECE}" dt="2019-12-10T14:57:07.368" v="86"/>
+          <ac:spMkLst>
+            <pc:docMk/>
+            <pc:sldMk cId="3711652313" sldId="263"/>
+            <ac:spMk id="4" creationId="{07C59AE4-A87B-4199-9476-DB28BB027E65}"/>
+          </ac:spMkLst>
+        </pc:spChg>
+      </pc:sldChg>
+      <pc:sldChg chg="modSp">
+        <pc:chgData name="Ron Swan" userId="44076a656deff5ba" providerId="LiveId" clId="{E503124C-2FAD-48FA-9C9B-BA6EF3D81ECE}" dt="2019-12-10T14:49:34.382" v="71" actId="20577"/>
+        <pc:sldMkLst>
+          <pc:docMk/>
+          <pc:sldMk cId="12212370" sldId="268"/>
+        </pc:sldMkLst>
+        <pc:spChg chg="mod">
+          <ac:chgData name="Ron Swan" userId="44076a656deff5ba" providerId="LiveId" clId="{E503124C-2FAD-48FA-9C9B-BA6EF3D81ECE}" dt="2019-12-10T14:49:34.382" v="71" actId="20577"/>
+          <ac:spMkLst>
+            <pc:docMk/>
+            <pc:sldMk cId="12212370" sldId="268"/>
+            <ac:spMk id="5" creationId="{B91B6ECC-15A9-4E37-A155-AB330FE8C6AB}"/>
+          </ac:spMkLst>
+        </pc:spChg>
+      </pc:sldChg>
+      <pc:sldChg chg="modSp">
+        <pc:chgData name="Ron Swan" userId="44076a656deff5ba" providerId="LiveId" clId="{E503124C-2FAD-48FA-9C9B-BA6EF3D81ECE}" dt="2019-12-10T14:54:18.677" v="78"/>
+        <pc:sldMkLst>
+          <pc:docMk/>
+          <pc:sldMk cId="3241347633" sldId="270"/>
+        </pc:sldMkLst>
+        <pc:spChg chg="mod">
+          <ac:chgData name="Ron Swan" userId="44076a656deff5ba" providerId="LiveId" clId="{E503124C-2FAD-48FA-9C9B-BA6EF3D81ECE}" dt="2019-12-10T14:54:16.070" v="77" actId="20577"/>
+          <ac:spMkLst>
+            <pc:docMk/>
+            <pc:sldMk cId="3241347633" sldId="270"/>
+            <ac:spMk id="4" creationId="{FCAD466C-7823-46B9-953F-3B24BA7C1293}"/>
+          </ac:spMkLst>
+        </pc:spChg>
+        <pc:spChg chg="mod">
+          <ac:chgData name="Ron Swan" userId="44076a656deff5ba" providerId="LiveId" clId="{E503124C-2FAD-48FA-9C9B-BA6EF3D81ECE}" dt="2019-12-10T14:54:18.677" v="78"/>
+          <ac:spMkLst>
+            <pc:docMk/>
+            <pc:sldMk cId="3241347633" sldId="270"/>
+            <ac:spMk id="5" creationId="{5151324B-04DB-407B-82C3-9236B519376A}"/>
+          </ac:spMkLst>
+        </pc:spChg>
+      </pc:sldChg>
+      <pc:sldChg chg="addSp delSp modSp add">
+        <pc:chgData name="Ron Swan" userId="44076a656deff5ba" providerId="LiveId" clId="{E503124C-2FAD-48FA-9C9B-BA6EF3D81ECE}" dt="2019-12-10T14:57:58.297" v="102" actId="122"/>
+        <pc:sldMkLst>
+          <pc:docMk/>
+          <pc:sldMk cId="426266811" sldId="273"/>
+        </pc:sldMkLst>
+        <pc:spChg chg="del">
+          <ac:chgData name="Ron Swan" userId="44076a656deff5ba" providerId="LiveId" clId="{E503124C-2FAD-48FA-9C9B-BA6EF3D81ECE}" dt="2019-12-10T14:57:25.029" v="88"/>
+          <ac:spMkLst>
+            <pc:docMk/>
+            <pc:sldMk cId="426266811" sldId="273"/>
+            <ac:spMk id="2" creationId="{E5E6238F-9F27-4BBF-A5D8-F420A379F9FB}"/>
+          </ac:spMkLst>
+        </pc:spChg>
+        <pc:spChg chg="add mod">
+          <ac:chgData name="Ron Swan" userId="44076a656deff5ba" providerId="LiveId" clId="{E503124C-2FAD-48FA-9C9B-BA6EF3D81ECE}" dt="2019-12-10T14:57:58.297" v="102" actId="122"/>
+          <ac:spMkLst>
+            <pc:docMk/>
+            <pc:sldMk cId="426266811" sldId="273"/>
+            <ac:spMk id="3" creationId="{864149D6-D97B-4BD5-ACF1-13C6F3896B82}"/>
+          </ac:spMkLst>
+        </pc:spChg>
+      </pc:sldChg>
+    </pc:docChg>
+  </pc:docChgLst>
+</pc:chgInfo>
 </file>
 
 <file path=ppt/slideLayouts/slideLayout1.xml><?xml version="1.0" encoding="utf-8"?>
@@ -6191,10 +6398,10 @@
       </p:sp>
       <p:sp>
         <p:nvSpPr>
-          <p:cNvPr id="3" name="Content Placeholder 2">
+          <p:cNvPr id="4" name="Text Placeholder 3">
             <a:extLst>
               <a:ext uri="{FF2B5EF4-FFF2-40B4-BE49-F238E27FC236}">
-                <a16:creationId xmlns:a16="http://schemas.microsoft.com/office/drawing/2014/main" id="{00A152CD-4285-4E88-BC88-159170865296}"/>
+                <a16:creationId xmlns:a16="http://schemas.microsoft.com/office/drawing/2014/main" id="{79BAA0D9-60A3-4B85-A709-DE00705903DC}"/>
               </a:ext>
             </a:extLst>
           </p:cNvPr>
@@ -6202,95 +6409,15 @@
             <a:spLocks noGrp="1"/>
           </p:cNvSpPr>
           <p:nvPr>
-            <p:ph idx="4294967295"/>
+            <p:ph type="body" idx="1"/>
           </p:nvPr>
         </p:nvSpPr>
-        <p:spPr>
-          <a:xfrm>
-            <a:off x="0" y="1825625"/>
-            <a:ext cx="10515600" cy="4351338"/>
-          </a:xfrm>
-        </p:spPr>
+        <p:spPr/>
         <p:txBody>
-          <a:bodyPr>
-            <a:normAutofit/>
-          </a:bodyPr>
+          <a:bodyPr/>
           <a:lstStyle/>
           <a:p>
-            <a:r>
-              <a:rPr lang="en-US" dirty="0"/>
-              <a:t>Input:</a:t>
-            </a:r>
-          </a:p>
-          <a:p>
-            <a:pPr marL="0" indent="0">
-              <a:buNone/>
-            </a:pPr>
-            <a:r>
-              <a:rPr lang="en-US" dirty="0"/>
-              <a:t>		Topic vocab</a:t>
-            </a:r>
-          </a:p>
-          <a:p>
-            <a:pPr marL="0" indent="0">
-              <a:buNone/>
-            </a:pPr>
-            <a:r>
-              <a:rPr lang="en-US" dirty="0"/>
-              <a:t>		Topic &lt;&gt; Aspect mapping (manual)</a:t>
-            </a:r>
-          </a:p>
-          <a:p>
-            <a:endParaRPr lang="en-US" dirty="0"/>
-          </a:p>
-          <a:p>
-            <a:r>
-              <a:rPr lang="en-US" dirty="0"/>
-              <a:t>Output:</a:t>
-            </a:r>
-          </a:p>
-          <a:p>
-            <a:pPr marL="0" indent="0">
-              <a:buNone/>
-            </a:pPr>
-            <a:r>
-              <a:rPr lang="en-US" dirty="0"/>
-              <a:t>		Aspect Classifier</a:t>
-            </a:r>
-          </a:p>
-          <a:p>
-            <a:pPr marL="0" indent="0">
-              <a:buNone/>
-            </a:pPr>
-            <a:endParaRPr lang="en-US" dirty="0"/>
-          </a:p>
-          <a:p>
-            <a:pPr marL="0" indent="0">
-              <a:buNone/>
-            </a:pPr>
-            <a:r>
-              <a:rPr lang="en-US" dirty="0"/>
-              <a:t>Example: 	</a:t>
-            </a:r>
-          </a:p>
-          <a:p>
-            <a:pPr marL="0" indent="0">
-              <a:buNone/>
-            </a:pPr>
-            <a:r>
-              <a:rPr lang="en-US" dirty="0"/>
-              <a:t>		IN	Topic   : Food Chinese pizza</a:t>
-            </a:r>
-          </a:p>
-          <a:p>
-            <a:pPr marL="0" indent="0">
-              <a:buNone/>
-            </a:pPr>
-            <a:r>
-              <a:rPr lang="en-US" dirty="0"/>
-              <a:t>		OUT	Aspect: Food</a:t>
-            </a:r>
-            <a:endParaRPr lang="de-CH" dirty="0"/>
+            <a:endParaRPr lang="en-US"/>
           </a:p>
         </p:txBody>
       </p:sp>
@@ -6355,10 +6482,10 @@
       </p:sp>
       <p:sp>
         <p:nvSpPr>
-          <p:cNvPr id="3" name="Content Placeholder 2">
+          <p:cNvPr id="4" name="Text Placeholder 3">
             <a:extLst>
               <a:ext uri="{FF2B5EF4-FFF2-40B4-BE49-F238E27FC236}">
-                <a16:creationId xmlns:a16="http://schemas.microsoft.com/office/drawing/2014/main" id="{6D5C250A-3D20-413E-8CE2-56CE0A7E94CE}"/>
+                <a16:creationId xmlns:a16="http://schemas.microsoft.com/office/drawing/2014/main" id="{4EDBB4BE-B5B7-423A-9971-9C344B132E53}"/>
               </a:ext>
             </a:extLst>
           </p:cNvPr>
@@ -6366,102 +6493,15 @@
             <a:spLocks noGrp="1"/>
           </p:cNvSpPr>
           <p:nvPr>
-            <p:ph idx="4294967295"/>
+            <p:ph type="body" idx="1"/>
           </p:nvPr>
         </p:nvSpPr>
-        <p:spPr>
-          <a:xfrm>
-            <a:off x="0" y="1825625"/>
-            <a:ext cx="10515600" cy="4351338"/>
-          </a:xfrm>
-        </p:spPr>
+        <p:spPr/>
         <p:txBody>
           <a:bodyPr/>
           <a:lstStyle/>
           <a:p>
-            <a:r>
-              <a:rPr lang="en-US" dirty="0"/>
-              <a:t>Input</a:t>
-            </a:r>
-            <a:endParaRPr lang="de-CH" dirty="0"/>
-          </a:p>
-          <a:p>
-            <a:pPr marL="0" indent="0">
-              <a:buNone/>
-            </a:pPr>
-            <a:r>
-              <a:rPr lang="de-CH" dirty="0"/>
-              <a:t>		Sentiment Text</a:t>
-            </a:r>
-          </a:p>
-          <a:p>
-            <a:pPr marL="0" indent="0">
-              <a:buNone/>
-            </a:pPr>
-            <a:r>
-              <a:rPr lang="de-CH" dirty="0"/>
-              <a:t>		(</a:t>
-            </a:r>
-            <a:r>
-              <a:rPr lang="de-CH" dirty="0" err="1"/>
-              <a:t>any</a:t>
-            </a:r>
-            <a:r>
-              <a:rPr lang="de-CH" dirty="0"/>
-              <a:t> </a:t>
-            </a:r>
-            <a:r>
-              <a:rPr lang="de-CH" dirty="0" err="1"/>
-              <a:t>text</a:t>
-            </a:r>
-            <a:r>
-              <a:rPr lang="de-CH" dirty="0"/>
-              <a:t>)</a:t>
-            </a:r>
-          </a:p>
-          <a:p>
-            <a:r>
-              <a:rPr lang="de-CH" dirty="0"/>
-              <a:t>Output:</a:t>
-            </a:r>
-            <a:endParaRPr lang="en-US" dirty="0"/>
-          </a:p>
-          <a:p>
-            <a:pPr marL="0" indent="0">
-              <a:buNone/>
-            </a:pPr>
-            <a:r>
-              <a:rPr lang="en-US" dirty="0"/>
-              <a:t>		Train:</a:t>
-            </a:r>
-          </a:p>
-          <a:p>
-            <a:pPr marL="0" indent="0">
-              <a:buNone/>
-            </a:pPr>
-            <a:r>
-              <a:rPr lang="en-US" dirty="0"/>
-              <a:t>			sentiment Classifier</a:t>
-            </a:r>
-          </a:p>
-          <a:p>
-            <a:pPr marL="0" indent="0">
-              <a:buNone/>
-            </a:pPr>
-            <a:r>
-              <a:rPr lang="de-CH" dirty="0"/>
-              <a:t>		Test:</a:t>
-            </a:r>
-          </a:p>
-          <a:p>
-            <a:pPr marL="0" indent="0">
-              <a:buNone/>
-            </a:pPr>
-            <a:r>
-              <a:rPr lang="de-CH" dirty="0"/>
-              <a:t>			Star Rating</a:t>
-            </a:r>
-            <a:endParaRPr lang="en-US" dirty="0"/>
+            <a:endParaRPr lang="en-US"/>
           </a:p>
         </p:txBody>
       </p:sp>
@@ -6526,10 +6566,10 @@
       </p:sp>
       <p:sp>
         <p:nvSpPr>
-          <p:cNvPr id="3" name="Content Placeholder 2">
+          <p:cNvPr id="4" name="Text Placeholder 3">
             <a:extLst>
               <a:ext uri="{FF2B5EF4-FFF2-40B4-BE49-F238E27FC236}">
-                <a16:creationId xmlns:a16="http://schemas.microsoft.com/office/drawing/2014/main" id="{605C0AD3-776C-4CA9-945C-9824E1F881A8}"/>
+                <a16:creationId xmlns:a16="http://schemas.microsoft.com/office/drawing/2014/main" id="{07C59AE4-A87B-4199-9476-DB28BB027E65}"/>
               </a:ext>
             </a:extLst>
           </p:cNvPr>
@@ -6537,110 +6577,15 @@
             <a:spLocks noGrp="1"/>
           </p:cNvSpPr>
           <p:nvPr>
-            <p:ph idx="4294967295"/>
+            <p:ph type="body" idx="1"/>
           </p:nvPr>
         </p:nvSpPr>
-        <p:spPr>
-          <a:xfrm>
-            <a:off x="0" y="1825625"/>
-            <a:ext cx="10515600" cy="4351338"/>
-          </a:xfrm>
-        </p:spPr>
+        <p:spPr/>
         <p:txBody>
-          <a:bodyPr>
-            <a:normAutofit/>
-          </a:bodyPr>
+          <a:bodyPr/>
           <a:lstStyle/>
           <a:p>
-            <a:r>
-              <a:rPr lang="en-US" dirty="0"/>
-              <a:t>Input</a:t>
-            </a:r>
-          </a:p>
-          <a:p>
-            <a:pPr marL="0" indent="0">
-              <a:buNone/>
-            </a:pPr>
-            <a:r>
-              <a:rPr lang="en-US" dirty="0"/>
-              <a:t>		Review Text</a:t>
-            </a:r>
-          </a:p>
-          <a:p>
-            <a:pPr marL="0" indent="0">
-              <a:buNone/>
-            </a:pPr>
-            <a:r>
-              <a:rPr lang="en-US" dirty="0"/>
-              <a:t>		Aspect Classifier</a:t>
-            </a:r>
-          </a:p>
-          <a:p>
-            <a:r>
-              <a:rPr lang="en-US" dirty="0"/>
-              <a:t>Output</a:t>
-            </a:r>
-          </a:p>
-          <a:p>
-            <a:pPr marL="0" indent="0">
-              <a:buNone/>
-            </a:pPr>
-            <a:r>
-              <a:rPr lang="en-US" dirty="0"/>
-              <a:t>		Classified text</a:t>
-            </a:r>
-          </a:p>
-          <a:p>
-            <a:pPr marL="0" indent="0">
-              <a:buNone/>
-            </a:pPr>
-            <a:endParaRPr lang="en-US" dirty="0"/>
-          </a:p>
-          <a:p>
-            <a:pPr marL="0" indent="0">
-              <a:buNone/>
-            </a:pPr>
-            <a:r>
-              <a:rPr lang="en-US" dirty="0"/>
-              <a:t>Example:</a:t>
-            </a:r>
-          </a:p>
-          <a:p>
-            <a:pPr marL="0" indent="0">
-              <a:buNone/>
-            </a:pPr>
-            <a:r>
-              <a:rPr lang="en-US" dirty="0"/>
-              <a:t>		IN	'Food was good. Service was no good'</a:t>
-            </a:r>
-          </a:p>
-          <a:p>
-            <a:pPr marL="0" indent="0">
-              <a:buNone/>
-            </a:pPr>
-            <a:r>
-              <a:rPr lang="en-US" dirty="0"/>
-              <a:t>		Out	{'</a:t>
-            </a:r>
-            <a:r>
-              <a:rPr lang="en-US" dirty="0" err="1"/>
-              <a:t>food':'Food</a:t>
-            </a:r>
-            <a:r>
-              <a:rPr lang="en-US" dirty="0"/>
-              <a:t> was </a:t>
-            </a:r>
-            <a:r>
-              <a:rPr lang="en-US" dirty="0" err="1"/>
-              <a:t>good','service':'Service</a:t>
-            </a:r>
-            <a:r>
-              <a:rPr lang="en-US" dirty="0"/>
-              <a:t> was not good'}</a:t>
-            </a:r>
-          </a:p>
-          <a:p>
-            <a:endParaRPr lang="de-CH" dirty="0"/>
+            <a:endParaRPr lang="en-US"/>
           </a:p>
         </p:txBody>
       </p:sp>
@@ -6776,6 +6721,70 @@
 </p:sld>
 </file>
 
+<file path=ppt/slides/slide14.xml><?xml version="1.0" encoding="utf-8"?>
+<p:sld xmlns:a="http://schemas.openxmlformats.org/drawingml/2006/main" xmlns:r="http://schemas.openxmlformats.org/officeDocument/2006/relationships" xmlns:p="http://schemas.openxmlformats.org/presentationml/2006/main">
+  <p:cSld>
+    <p:spTree>
+      <p:nvGrpSpPr>
+        <p:cNvPr id="1" name=""/>
+        <p:cNvGrpSpPr/>
+        <p:nvPr/>
+      </p:nvGrpSpPr>
+      <p:grpSpPr>
+        <a:xfrm>
+          <a:off x="0" y="0"/>
+          <a:ext cx="0" cy="0"/>
+          <a:chOff x="0" y="0"/>
+          <a:chExt cx="0" cy="0"/>
+        </a:xfrm>
+      </p:grpSpPr>
+      <p:sp>
+        <p:nvSpPr>
+          <p:cNvPr id="3" name="Title 2">
+            <a:extLst>
+              <a:ext uri="{FF2B5EF4-FFF2-40B4-BE49-F238E27FC236}">
+                <a16:creationId xmlns:a16="http://schemas.microsoft.com/office/drawing/2014/main" id="{864149D6-D97B-4BD5-ACF1-13C6F3896B82}"/>
+              </a:ext>
+            </a:extLst>
+          </p:cNvPr>
+          <p:cNvSpPr>
+            <a:spLocks noGrp="1"/>
+          </p:cNvSpPr>
+          <p:nvPr>
+            <p:ph type="title"/>
+          </p:nvPr>
+        </p:nvSpPr>
+        <p:spPr>
+          <a:xfrm>
+            <a:off x="1944600" y="701800"/>
+            <a:ext cx="8302800" cy="5454400"/>
+          </a:xfrm>
+        </p:spPr>
+        <p:txBody>
+          <a:bodyPr/>
+          <a:lstStyle/>
+          <a:p>
+            <a:pPr algn="ctr"/>
+            <a:r>
+              <a:rPr lang="en-US" dirty="0"/>
+              <a:t>Thank You!</a:t>
+            </a:r>
+          </a:p>
+        </p:txBody>
+      </p:sp>
+    </p:spTree>
+    <p:extLst>
+      <p:ext uri="{BB962C8B-B14F-4D97-AF65-F5344CB8AC3E}">
+        <p14:creationId xmlns:p14="http://schemas.microsoft.com/office/powerpoint/2010/main" val="426266811"/>
+      </p:ext>
+    </p:extLst>
+  </p:cSld>
+  <p:clrMapOvr>
+    <a:masterClrMapping/>
+  </p:clrMapOvr>
+</p:sld>
+</file>
+
 <file path=ppt/slides/slide2.xml><?xml version="1.0" encoding="utf-8"?>
 <p:sld xmlns:a="http://schemas.openxmlformats.org/drawingml/2006/main" xmlns:r="http://schemas.openxmlformats.org/officeDocument/2006/relationships" xmlns:p="http://schemas.openxmlformats.org/presentationml/2006/main">
   <p:cSld>
@@ -6848,7 +6857,7 @@
             </a:r>
             <a:r>
               <a:rPr lang="en-US" dirty="0"/>
-              <a:t> Imtiaz   - </a:t>
+              <a:t> Imtiaz   - aimtiaz@Illinois.edu</a:t>
             </a:r>
           </a:p>
           <a:p>
@@ -6857,7 +6866,7 @@
           <a:p>
             <a:r>
               <a:rPr lang="en-US" dirty="0"/>
-              <a:t>Ron Swan</a:t>
+              <a:t>Ron Swan – rdswan2@Illinois.edu</a:t>
             </a:r>
           </a:p>
           <a:p>
@@ -6872,7 +6881,10 @@
               <a:rPr lang="en-US" dirty="0" err="1"/>
               <a:t>Veluru</a:t>
             </a:r>
-            <a:endParaRPr lang="en-US" dirty="0"/>
+            <a:r>
+              <a:rPr lang="en-US" dirty="0"/>
+              <a:t> – kveluru2@Illinois.edu</a:t>
+            </a:r>
           </a:p>
         </p:txBody>
       </p:sp>
@@ -7362,10 +7374,10 @@
       </p:sp>
       <p:sp>
         <p:nvSpPr>
-          <p:cNvPr id="6" name="Rectangle 5">
+          <p:cNvPr id="8" name="Rectangle 7">
             <a:extLst>
               <a:ext uri="{FF2B5EF4-FFF2-40B4-BE49-F238E27FC236}">
-                <a16:creationId xmlns:a16="http://schemas.microsoft.com/office/drawing/2014/main" id="{F4261642-FD63-420A-A617-487F754A6C94}"/>
+                <a16:creationId xmlns:a16="http://schemas.microsoft.com/office/drawing/2014/main" id="{B5115544-5A90-4AF2-AEF2-F79A4E1037E6}"/>
               </a:ext>
             </a:extLst>
           </p:cNvPr>
@@ -7374,7 +7386,7 @@
         </p:nvSpPr>
         <p:spPr>
           <a:xfrm>
-            <a:off x="3706144" y="3976843"/>
+            <a:off x="3706144" y="4098908"/>
             <a:ext cx="2854518" cy="469127"/>
           </a:xfrm>
           <a:prstGeom prst="rect">
@@ -7411,7 +7423,7 @@
                   <a:schemeClr val="tx1"/>
                 </a:solidFill>
               </a:rPr>
-              <a:t>Aspect Clustering</a:t>
+              <a:t>Sentiment Analysis</a:t>
             </a:r>
             <a:endParaRPr lang="de-CH" dirty="0">
               <a:solidFill>
@@ -7423,10 +7435,10 @@
       </p:sp>
       <p:sp>
         <p:nvSpPr>
-          <p:cNvPr id="8" name="Rectangle 7">
+          <p:cNvPr id="9" name="Rectangle 8">
             <a:extLst>
               <a:ext uri="{FF2B5EF4-FFF2-40B4-BE49-F238E27FC236}">
-                <a16:creationId xmlns:a16="http://schemas.microsoft.com/office/drawing/2014/main" id="{B5115544-5A90-4AF2-AEF2-F79A4E1037E6}"/>
+                <a16:creationId xmlns:a16="http://schemas.microsoft.com/office/drawing/2014/main" id="{6D8C24F3-A58E-4CAC-B472-6E774C9CEF74}"/>
               </a:ext>
             </a:extLst>
           </p:cNvPr>
@@ -7435,7 +7447,7 @@
         </p:nvSpPr>
         <p:spPr>
           <a:xfrm>
-            <a:off x="3706144" y="4622227"/>
+            <a:off x="3706144" y="4806776"/>
             <a:ext cx="2854518" cy="469127"/>
           </a:xfrm>
           <a:prstGeom prst="rect">
@@ -7472,68 +7484,7 @@
                   <a:schemeClr val="tx1"/>
                 </a:solidFill>
               </a:rPr>
-              <a:t>Sentiment Classification</a:t>
-            </a:r>
-            <a:endParaRPr lang="de-CH" dirty="0">
-              <a:solidFill>
-                <a:schemeClr val="tx1"/>
-              </a:solidFill>
-            </a:endParaRPr>
-          </a:p>
-        </p:txBody>
-      </p:sp>
-      <p:sp>
-        <p:nvSpPr>
-          <p:cNvPr id="9" name="Rectangle 8">
-            <a:extLst>
-              <a:ext uri="{FF2B5EF4-FFF2-40B4-BE49-F238E27FC236}">
-                <a16:creationId xmlns:a16="http://schemas.microsoft.com/office/drawing/2014/main" id="{6D8C24F3-A58E-4CAC-B472-6E774C9CEF74}"/>
-              </a:ext>
-            </a:extLst>
-          </p:cNvPr>
-          <p:cNvSpPr/>
-          <p:nvPr/>
-        </p:nvSpPr>
-        <p:spPr>
-          <a:xfrm>
-            <a:off x="3706144" y="5278878"/>
-            <a:ext cx="2854518" cy="469127"/>
-          </a:xfrm>
-          <a:prstGeom prst="rect">
-            <a:avLst/>
-          </a:prstGeom>
-          <a:solidFill>
-            <a:schemeClr val="bg1"/>
-          </a:solidFill>
-        </p:spPr>
-        <p:style>
-          <a:lnRef idx="2">
-            <a:schemeClr val="accent1">
-              <a:shade val="50000"/>
-            </a:schemeClr>
-          </a:lnRef>
-          <a:fillRef idx="1">
-            <a:schemeClr val="accent1"/>
-          </a:fillRef>
-          <a:effectRef idx="0">
-            <a:schemeClr val="accent1"/>
-          </a:effectRef>
-          <a:fontRef idx="minor">
-            <a:schemeClr val="lt1"/>
-          </a:fontRef>
-        </p:style>
-        <p:txBody>
-          <a:bodyPr rtlCol="0" anchor="ctr"/>
-          <a:lstStyle/>
-          <a:p>
-            <a:pPr algn="ctr"/>
-            <a:r>
-              <a:rPr lang="en-US" dirty="0">
-                <a:solidFill>
-                  <a:schemeClr val="tx1"/>
-                </a:solidFill>
-              </a:rPr>
-              <a:t>Aspect Rating</a:t>
+              <a:t>Aspect Analysis</a:t>
             </a:r>
             <a:endParaRPr lang="de-CH" dirty="0">
               <a:solidFill>
@@ -7557,7 +7508,7 @@
         </p:nvSpPr>
         <p:spPr>
           <a:xfrm>
-            <a:off x="3706144" y="5903982"/>
+            <a:off x="3706144" y="5498013"/>
             <a:ext cx="2854518" cy="469127"/>
           </a:xfrm>
           <a:prstGeom prst="rect">
@@ -7665,10 +7616,10 @@
       </p:sp>
       <p:sp>
         <p:nvSpPr>
-          <p:cNvPr id="3" name="Content Placeholder 2">
+          <p:cNvPr id="4" name="Text Placeholder 3">
             <a:extLst>
               <a:ext uri="{FF2B5EF4-FFF2-40B4-BE49-F238E27FC236}">
-                <a16:creationId xmlns:a16="http://schemas.microsoft.com/office/drawing/2014/main" id="{7E80B9DE-1FB2-4035-BA0B-C863A9A85F68}"/>
+                <a16:creationId xmlns:a16="http://schemas.microsoft.com/office/drawing/2014/main" id="{DF60E5D6-5969-4DDD-AE3B-5FB5C4B85C79}"/>
               </a:ext>
             </a:extLst>
           </p:cNvPr>
@@ -7676,136 +7627,14 @@
             <a:spLocks noGrp="1"/>
           </p:cNvSpPr>
           <p:nvPr>
-            <p:ph idx="4294967295"/>
+            <p:ph type="body" idx="1"/>
           </p:nvPr>
         </p:nvSpPr>
-        <p:spPr>
-          <a:xfrm>
-            <a:off x="0" y="1825625"/>
-            <a:ext cx="10515600" cy="4351338"/>
-          </a:xfrm>
-        </p:spPr>
+        <p:spPr/>
         <p:txBody>
           <a:bodyPr/>
           <a:lstStyle/>
           <a:p>
-            <a:r>
-              <a:rPr lang="en-US" dirty="0"/>
-              <a:t>Input:	Review Text</a:t>
-            </a:r>
-          </a:p>
-          <a:p>
-            <a:r>
-              <a:rPr lang="de-CH" dirty="0" err="1"/>
-              <a:t>Process</a:t>
-            </a:r>
-            <a:r>
-              <a:rPr lang="de-CH" dirty="0"/>
-              <a:t>:	Clean Text</a:t>
-            </a:r>
-          </a:p>
-          <a:p>
-            <a:pPr marL="0" indent="0">
-              <a:buNone/>
-            </a:pPr>
-            <a:r>
-              <a:rPr lang="de-CH" dirty="0"/>
-              <a:t>		</a:t>
-            </a:r>
-            <a:r>
-              <a:rPr lang="de-CH" dirty="0" err="1"/>
-              <a:t>tokenize</a:t>
-            </a:r>
-            <a:endParaRPr lang="de-CH" dirty="0"/>
-          </a:p>
-          <a:p>
-            <a:pPr marL="0" indent="0">
-              <a:buNone/>
-            </a:pPr>
-            <a:r>
-              <a:rPr lang="de-CH" dirty="0"/>
-              <a:t>		POS </a:t>
-            </a:r>
-            <a:r>
-              <a:rPr lang="de-CH" dirty="0" err="1"/>
-              <a:t>tagging</a:t>
-            </a:r>
-            <a:endParaRPr lang="de-CH" dirty="0"/>
-          </a:p>
-          <a:p>
-            <a:pPr marL="0" indent="0">
-              <a:buNone/>
-            </a:pPr>
-            <a:r>
-              <a:rPr lang="de-CH" dirty="0"/>
-              <a:t>		</a:t>
-            </a:r>
-            <a:r>
-              <a:rPr lang="de-CH" dirty="0" err="1"/>
-              <a:t>Stop</a:t>
-            </a:r>
-            <a:r>
-              <a:rPr lang="de-CH" dirty="0"/>
-              <a:t> </a:t>
-            </a:r>
-            <a:r>
-              <a:rPr lang="de-CH" dirty="0" err="1"/>
-              <a:t>word</a:t>
-            </a:r>
-            <a:r>
-              <a:rPr lang="de-CH" dirty="0"/>
-              <a:t> </a:t>
-            </a:r>
-            <a:r>
-              <a:rPr lang="de-CH" dirty="0" err="1"/>
-              <a:t>removal</a:t>
-            </a:r>
-            <a:endParaRPr lang="de-CH" dirty="0"/>
-          </a:p>
-          <a:p>
-            <a:r>
-              <a:rPr lang="de-CH" dirty="0"/>
-              <a:t>Output:</a:t>
-            </a:r>
-          </a:p>
-          <a:p>
-            <a:pPr marL="0" indent="0">
-              <a:buNone/>
-            </a:pPr>
-            <a:r>
-              <a:rPr lang="de-CH" dirty="0"/>
-              <a:t>		Topic Text 		[PN, N, V]</a:t>
-            </a:r>
-          </a:p>
-          <a:p>
-            <a:pPr marL="0" indent="0">
-              <a:buNone/>
-            </a:pPr>
-            <a:r>
-              <a:rPr lang="de-CH" dirty="0"/>
-              <a:t>		Sentiment Text	[PN, N, V, </a:t>
-            </a:r>
-            <a:r>
-              <a:rPr lang="de-CH" dirty="0" err="1"/>
-              <a:t>Adj</a:t>
-            </a:r>
-            <a:r>
-              <a:rPr lang="de-CH" dirty="0"/>
-              <a:t>, </a:t>
-            </a:r>
-            <a:r>
-              <a:rPr lang="de-CH" dirty="0" err="1"/>
-              <a:t>Adv</a:t>
-            </a:r>
-            <a:r>
-              <a:rPr lang="de-CH" dirty="0"/>
-              <a:t>]</a:t>
-            </a:r>
-          </a:p>
-          <a:p>
-            <a:pPr marL="1828800" lvl="4" indent="0">
-              <a:buNone/>
-            </a:pPr>
             <a:endParaRPr lang="en-US" dirty="0"/>
           </a:p>
         </p:txBody>
@@ -7863,7 +7692,7 @@
           <a:p>
             <a:r>
               <a:rPr lang="en-US" dirty="0"/>
-              <a:t>Topic Modeling</a:t>
+              <a:t>Topic Mining</a:t>
             </a:r>
           </a:p>
         </p:txBody>
@@ -7888,6 +7717,24 @@
         <p:txBody>
           <a:bodyPr/>
           <a:lstStyle/>
+          <a:p>
+            <a:r>
+              <a:rPr lang="en-US" dirty="0"/>
+              <a:t>The overall theme in the review</a:t>
+            </a:r>
+          </a:p>
+          <a:p>
+            <a:r>
+              <a:rPr lang="en-US" dirty="0"/>
+              <a:t>The positive topic if any</a:t>
+            </a:r>
+          </a:p>
+          <a:p>
+            <a:r>
+              <a:rPr lang="en-US" dirty="0"/>
+              <a:t>The negative topic if any</a:t>
+            </a:r>
+          </a:p>
           <a:p>
             <a:endParaRPr lang="en-US" dirty="0"/>
           </a:p>

</xml_diff>